<commit_message>
Updated the final ppt.
</commit_message>
<xml_diff>
--- a/Livrable/Soutenance/PROJET-S8-TIC.pptx
+++ b/Livrable/Soutenance/PROJET-S8-TIC.pptx
@@ -176,7 +176,7 @@
             </a:lvl1pPr>
           </a:lstStyle>
           <a:p>
-            <a:endParaRPr lang="fr-FR"/>
+            <a:endParaRPr lang="fr-FR" dirty="0"/>
           </a:p>
         </p:txBody>
       </p:sp>
@@ -209,9 +209,9 @@
           <a:p>
             <a:fld id="{2E4F561D-ECF7-43BF-A4A6-4EA64B3F6DC9}" type="datetimeFigureOut">
               <a:rPr lang="fr-FR" smtClean="0"/>
-              <a:t>11/05/2017</a:t>
+              <a:t>12/05/2017</a:t>
             </a:fld>
-            <a:endParaRPr lang="fr-FR"/>
+            <a:endParaRPr lang="fr-FR" dirty="0"/>
           </a:p>
         </p:txBody>
       </p:sp>
@@ -244,7 +244,7 @@
           <a:bodyPr vert="horz" lIns="91440" tIns="45720" rIns="91440" bIns="45720" rtlCol="0" anchor="ctr"/>
           <a:lstStyle/>
           <a:p>
-            <a:endParaRPr lang="fr-FR"/>
+            <a:endParaRPr lang="fr-FR" dirty="0"/>
           </a:p>
         </p:txBody>
       </p:sp>
@@ -334,7 +334,7 @@
             </a:lvl1pPr>
           </a:lstStyle>
           <a:p>
-            <a:endParaRPr lang="fr-FR"/>
+            <a:endParaRPr lang="fr-FR" dirty="0"/>
           </a:p>
         </p:txBody>
       </p:sp>
@@ -367,9 +367,9 @@
           <a:p>
             <a:fld id="{73B03F98-F185-4607-8D2F-83739028B1C1}" type="slidenum">
               <a:rPr lang="fr-FR" smtClean="0"/>
-              <a:t>‹#›</a:t>
+              <a:t>‹N°›</a:t>
             </a:fld>
-            <a:endParaRPr lang="fr-FR"/>
+            <a:endParaRPr lang="fr-FR" dirty="0"/>
           </a:p>
         </p:txBody>
       </p:sp>
@@ -474,6 +474,254 @@
     </a:lvl9pPr>
   </p:notesStyle>
 </p:notesMaster>
+</file>
+
+<file path=ppt/notesSlides/notesSlide1.xml><?xml version="1.0" encoding="utf-8"?>
+<p:notes xmlns:a="http://schemas.openxmlformats.org/drawingml/2006/main" xmlns:r="http://schemas.openxmlformats.org/officeDocument/2006/relationships" xmlns:p="http://schemas.openxmlformats.org/presentationml/2006/main">
+  <p:cSld>
+    <p:spTree>
+      <p:nvGrpSpPr>
+        <p:cNvPr id="1" name=""/>
+        <p:cNvGrpSpPr/>
+        <p:nvPr/>
+      </p:nvGrpSpPr>
+      <p:grpSpPr>
+        <a:xfrm>
+          <a:off x="0" y="0"/>
+          <a:ext cx="0" cy="0"/>
+          <a:chOff x="0" y="0"/>
+          <a:chExt cx="0" cy="0"/>
+        </a:xfrm>
+      </p:grpSpPr>
+      <p:sp>
+        <p:nvSpPr>
+          <p:cNvPr id="2" name="幻灯片图像占位符 1"/>
+          <p:cNvSpPr>
+            <a:spLocks noGrp="1" noRot="1" noChangeAspect="1"/>
+          </p:cNvSpPr>
+          <p:nvPr>
+            <p:ph type="sldImg"/>
+          </p:nvPr>
+        </p:nvSpPr>
+        <p:spPr/>
+      </p:sp>
+      <p:sp>
+        <p:nvSpPr>
+          <p:cNvPr id="3" name="备注占位符 2"/>
+          <p:cNvSpPr>
+            <a:spLocks noGrp="1"/>
+          </p:cNvSpPr>
+          <p:nvPr>
+            <p:ph type="body" idx="1"/>
+          </p:nvPr>
+        </p:nvSpPr>
+        <p:spPr/>
+        <p:txBody>
+          <a:bodyPr/>
+          <a:lstStyle/>
+          <a:p>
+            <a:r>
+              <a:rPr lang="en-US" altLang="zh-CN" dirty="0"/>
+              <a:t>As we see in the general architecture, our client has impose some technologies that we must use. For the database, we use </a:t>
+            </a:r>
+            <a:r>
+              <a:rPr lang="en-US" altLang="zh-CN" dirty="0" err="1"/>
+              <a:t>MySql</a:t>
+            </a:r>
+            <a:r>
+              <a:rPr lang="en-US" altLang="zh-CN" dirty="0"/>
+              <a:t> which is a lightweight opensource database management system, and of cause we have chosen </a:t>
+            </a:r>
+            <a:r>
+              <a:rPr lang="en-US" altLang="zh-CN" dirty="0" err="1"/>
+              <a:t>MySql</a:t>
+            </a:r>
+            <a:r>
+              <a:rPr lang="en-US" altLang="zh-CN" dirty="0"/>
+              <a:t> workbench to develop and manage our database. Our client has also impose Apache Tomcat as a web server and container, so we have to use Java as the programming language for Tomcat server, including Java standard edition and the enterprise edition, and then we have chosen Eclipse J2EE version as integrated development environment. For version control, we use </a:t>
+            </a:r>
+            <a:r>
+              <a:rPr lang="en-US" altLang="zh-CN" dirty="0" err="1"/>
+              <a:t>git</a:t>
+            </a:r>
+            <a:r>
+              <a:rPr lang="en-US" altLang="zh-CN" dirty="0"/>
+              <a:t>, and we chose Bitbucket to store our </a:t>
+            </a:r>
+            <a:r>
+              <a:rPr lang="en-US" altLang="zh-CN" dirty="0" err="1"/>
+              <a:t>git</a:t>
+            </a:r>
+            <a:r>
+              <a:rPr lang="en-US" altLang="zh-CN" dirty="0"/>
+              <a:t> repository because they offer free private repository. In order to avoid using </a:t>
+            </a:r>
+            <a:r>
+              <a:rPr lang="en-US" altLang="zh-CN" dirty="0" err="1"/>
+              <a:t>git</a:t>
+            </a:r>
+            <a:r>
+              <a:rPr lang="en-US" altLang="zh-CN" dirty="0"/>
+              <a:t> with the traditional command line, we use </a:t>
+            </a:r>
+            <a:r>
+              <a:rPr lang="en-US" altLang="zh-CN" dirty="0" err="1"/>
+              <a:t>SourceTree</a:t>
+            </a:r>
+            <a:r>
+              <a:rPr lang="en-US" altLang="zh-CN" dirty="0"/>
+              <a:t> which offer a</a:t>
+            </a:r>
+            <a:r>
+              <a:rPr lang="zh-CN" altLang="en-US" dirty="0"/>
+              <a:t> </a:t>
+            </a:r>
+            <a:r>
+              <a:rPr lang="en-US" altLang="zh-CN" dirty="0"/>
+              <a:t>graphical user</a:t>
+            </a:r>
+            <a:r>
+              <a:rPr lang="zh-CN" altLang="en-US" dirty="0"/>
+              <a:t> </a:t>
+            </a:r>
+            <a:r>
+              <a:rPr lang="en-US" altLang="zh-CN" dirty="0"/>
+              <a:t>interface to use </a:t>
+            </a:r>
+            <a:r>
+              <a:rPr lang="en-US" altLang="zh-CN" dirty="0" err="1"/>
+              <a:t>git</a:t>
+            </a:r>
+            <a:r>
+              <a:rPr lang="en-US" altLang="zh-CN" dirty="0"/>
+              <a:t>. Finally we use Trello for Scrum.</a:t>
+            </a:r>
+            <a:endParaRPr lang="zh-CN" altLang="en-US" dirty="0"/>
+          </a:p>
+        </p:txBody>
+      </p:sp>
+      <p:sp>
+        <p:nvSpPr>
+          <p:cNvPr id="4" name="灯片编号占位符 3"/>
+          <p:cNvSpPr>
+            <a:spLocks noGrp="1"/>
+          </p:cNvSpPr>
+          <p:nvPr>
+            <p:ph type="sldNum" sz="quarter" idx="10"/>
+          </p:nvPr>
+        </p:nvSpPr>
+        <p:spPr/>
+        <p:txBody>
+          <a:bodyPr/>
+          <a:lstStyle/>
+          <a:p>
+            <a:fld id="{73B03F98-F185-4607-8D2F-83739028B1C1}" type="slidenum">
+              <a:rPr lang="fr-FR" smtClean="0"/>
+              <a:t>6</a:t>
+            </a:fld>
+            <a:endParaRPr lang="fr-FR"/>
+          </a:p>
+        </p:txBody>
+      </p:sp>
+    </p:spTree>
+    <p:extLst>
+      <p:ext uri="{BB962C8B-B14F-4D97-AF65-F5344CB8AC3E}">
+        <p14:creationId xmlns:p14="http://schemas.microsoft.com/office/powerpoint/2010/main" val="336630532"/>
+      </p:ext>
+    </p:extLst>
+  </p:cSld>
+  <p:clrMapOvr>
+    <a:masterClrMapping/>
+  </p:clrMapOvr>
+</p:notes>
+</file>
+
+<file path=ppt/notesSlides/notesSlide2.xml><?xml version="1.0" encoding="utf-8"?>
+<p:notes xmlns:a="http://schemas.openxmlformats.org/drawingml/2006/main" xmlns:r="http://schemas.openxmlformats.org/officeDocument/2006/relationships" xmlns:p="http://schemas.openxmlformats.org/presentationml/2006/main">
+  <p:cSld>
+    <p:spTree>
+      <p:nvGrpSpPr>
+        <p:cNvPr id="1" name=""/>
+        <p:cNvGrpSpPr/>
+        <p:nvPr/>
+      </p:nvGrpSpPr>
+      <p:grpSpPr>
+        <a:xfrm>
+          <a:off x="0" y="0"/>
+          <a:ext cx="0" cy="0"/>
+          <a:chOff x="0" y="0"/>
+          <a:chExt cx="0" cy="0"/>
+        </a:xfrm>
+      </p:grpSpPr>
+      <p:sp>
+        <p:nvSpPr>
+          <p:cNvPr id="2" name="幻灯片图像占位符 1"/>
+          <p:cNvSpPr>
+            <a:spLocks noGrp="1" noRot="1" noChangeAspect="1"/>
+          </p:cNvSpPr>
+          <p:nvPr>
+            <p:ph type="sldImg"/>
+          </p:nvPr>
+        </p:nvSpPr>
+        <p:spPr/>
+      </p:sp>
+      <p:sp>
+        <p:nvSpPr>
+          <p:cNvPr id="3" name="备注占位符 2"/>
+          <p:cNvSpPr>
+            <a:spLocks noGrp="1"/>
+          </p:cNvSpPr>
+          <p:nvPr>
+            <p:ph type="body" idx="1"/>
+          </p:nvPr>
+        </p:nvSpPr>
+        <p:spPr/>
+        <p:txBody>
+          <a:bodyPr/>
+          <a:lstStyle/>
+          <a:p>
+            <a:r>
+              <a:rPr lang="en-US" altLang="zh-CN" dirty="0"/>
+              <a:t>Scrum is a agile development method. We first made a product backlog with our client, it contains a list of user story that we have to accomplish during the development, in 5 sprint. For each sprint we have 7 day. We first make a to do list in the sprint backlog, and every day during a sprint we develop, at the end of a sprint we show our deliverable product to our client in order to get feed back. And we start the next sprint.</a:t>
+            </a:r>
+            <a:endParaRPr lang="zh-CN" altLang="en-US" dirty="0"/>
+          </a:p>
+        </p:txBody>
+      </p:sp>
+      <p:sp>
+        <p:nvSpPr>
+          <p:cNvPr id="4" name="灯片编号占位符 3"/>
+          <p:cNvSpPr>
+            <a:spLocks noGrp="1"/>
+          </p:cNvSpPr>
+          <p:nvPr>
+            <p:ph type="sldNum" sz="quarter" idx="10"/>
+          </p:nvPr>
+        </p:nvSpPr>
+        <p:spPr/>
+        <p:txBody>
+          <a:bodyPr/>
+          <a:lstStyle/>
+          <a:p>
+            <a:fld id="{73B03F98-F185-4607-8D2F-83739028B1C1}" type="slidenum">
+              <a:rPr lang="fr-FR" smtClean="0"/>
+              <a:t>7</a:t>
+            </a:fld>
+            <a:endParaRPr lang="fr-FR"/>
+          </a:p>
+        </p:txBody>
+      </p:sp>
+    </p:spTree>
+    <p:extLst>
+      <p:ext uri="{BB962C8B-B14F-4D97-AF65-F5344CB8AC3E}">
+        <p14:creationId xmlns:p14="http://schemas.microsoft.com/office/powerpoint/2010/main" val="2988946180"/>
+      </p:ext>
+    </p:extLst>
+  </p:cSld>
+  <p:clrMapOvr>
+    <a:masterClrMapping/>
+  </p:clrMapOvr>
+</p:notes>
 </file>
 
 <file path=ppt/slideLayouts/slideLayout1.xml><?xml version="1.0" encoding="utf-8"?>
@@ -807,9 +1055,9 @@
           <a:p>
             <a:fld id="{DAF27641-F701-42F9-A65A-A14E3A07BFA3}" type="datetime1">
               <a:rPr lang="fr-FR" smtClean="0"/>
-              <a:t>11/05/2017</a:t>
+              <a:t>12/05/2017</a:t>
             </a:fld>
-            <a:endParaRPr lang="fr-FR"/>
+            <a:endParaRPr lang="fr-FR" dirty="0"/>
           </a:p>
         </p:txBody>
       </p:sp>
@@ -833,7 +1081,7 @@
           <a:bodyPr/>
           <a:lstStyle/>
           <a:p>
-            <a:endParaRPr lang="fr-FR"/>
+            <a:endParaRPr lang="fr-FR" dirty="0"/>
           </a:p>
         </p:txBody>
       </p:sp>
@@ -859,9 +1107,9 @@
           <a:p>
             <a:fld id="{6CDE4B3E-07BE-4C1A-80EE-ED6CBF0AA269}" type="slidenum">
               <a:rPr lang="fr-FR" smtClean="0"/>
-              <a:t>‹#›</a:t>
+              <a:t>‹N°›</a:t>
             </a:fld>
-            <a:endParaRPr lang="fr-FR"/>
+            <a:endParaRPr lang="fr-FR" dirty="0"/>
           </a:p>
         </p:txBody>
       </p:sp>
@@ -1045,10 +1293,9 @@
           </a:lstStyle>
           <a:p>
             <a:r>
-              <a:rPr lang="en-US"/>
+              <a:rPr lang="en-US" dirty="0"/>
               <a:t>Click icon to add picture</a:t>
             </a:r>
-            <a:endParaRPr lang="en-US" dirty="0"/>
           </a:p>
         </p:txBody>
       </p:sp>
@@ -1136,9 +1383,9 @@
           <a:p>
             <a:fld id="{7FAE517F-65EA-424D-BDC1-81ADE81A0D61}" type="datetime1">
               <a:rPr lang="fr-FR" smtClean="0"/>
-              <a:t>11/05/2017</a:t>
+              <a:t>12/05/2017</a:t>
             </a:fld>
-            <a:endParaRPr lang="fr-FR"/>
+            <a:endParaRPr lang="fr-FR" dirty="0"/>
           </a:p>
         </p:txBody>
       </p:sp>
@@ -1157,7 +1404,7 @@
           <a:bodyPr/>
           <a:lstStyle/>
           <a:p>
-            <a:endParaRPr lang="fr-FR"/>
+            <a:endParaRPr lang="fr-FR" dirty="0"/>
           </a:p>
         </p:txBody>
       </p:sp>
@@ -1178,9 +1425,9 @@
           <a:p>
             <a:fld id="{6CDE4B3E-07BE-4C1A-80EE-ED6CBF0AA269}" type="slidenum">
               <a:rPr lang="fr-FR" smtClean="0"/>
-              <a:t>‹#›</a:t>
+              <a:t>‹N°›</a:t>
             </a:fld>
-            <a:endParaRPr lang="fr-FR"/>
+            <a:endParaRPr lang="fr-FR" dirty="0"/>
           </a:p>
         </p:txBody>
       </p:sp>
@@ -1384,9 +1631,9 @@
           <a:p>
             <a:fld id="{7186D9A7-9618-4944-9332-1865AA5E896F}" type="datetime1">
               <a:rPr lang="fr-FR" smtClean="0"/>
-              <a:t>11/05/2017</a:t>
+              <a:t>12/05/2017</a:t>
             </a:fld>
-            <a:endParaRPr lang="fr-FR"/>
+            <a:endParaRPr lang="fr-FR" dirty="0"/>
           </a:p>
         </p:txBody>
       </p:sp>
@@ -1405,7 +1652,7 @@
           <a:bodyPr/>
           <a:lstStyle/>
           <a:p>
-            <a:endParaRPr lang="fr-FR"/>
+            <a:endParaRPr lang="fr-FR" dirty="0"/>
           </a:p>
         </p:txBody>
       </p:sp>
@@ -1426,9 +1673,9 @@
           <a:p>
             <a:fld id="{6CDE4B3E-07BE-4C1A-80EE-ED6CBF0AA269}" type="slidenum">
               <a:rPr lang="fr-FR" smtClean="0"/>
-              <a:t>‹#›</a:t>
+              <a:t>‹N°›</a:t>
             </a:fld>
-            <a:endParaRPr lang="fr-FR"/>
+            <a:endParaRPr lang="fr-FR" dirty="0"/>
           </a:p>
         </p:txBody>
       </p:sp>
@@ -1723,9 +1970,9 @@
           <a:p>
             <a:fld id="{AAD3EE58-CE47-4F57-814A-8FA20B152E2F}" type="datetime1">
               <a:rPr lang="fr-FR" smtClean="0"/>
-              <a:t>11/05/2017</a:t>
+              <a:t>12/05/2017</a:t>
             </a:fld>
-            <a:endParaRPr lang="fr-FR"/>
+            <a:endParaRPr lang="fr-FR" dirty="0"/>
           </a:p>
         </p:txBody>
       </p:sp>
@@ -1744,7 +1991,7 @@
           <a:bodyPr/>
           <a:lstStyle/>
           <a:p>
-            <a:endParaRPr lang="fr-FR"/>
+            <a:endParaRPr lang="fr-FR" dirty="0"/>
           </a:p>
         </p:txBody>
       </p:sp>
@@ -1765,9 +2012,9 @@
           <a:p>
             <a:fld id="{6CDE4B3E-07BE-4C1A-80EE-ED6CBF0AA269}" type="slidenum">
               <a:rPr lang="fr-FR" smtClean="0"/>
-              <a:t>‹#›</a:t>
+              <a:t>‹N°›</a:t>
             </a:fld>
-            <a:endParaRPr lang="fr-FR"/>
+            <a:endParaRPr lang="fr-FR" dirty="0"/>
           </a:p>
         </p:txBody>
       </p:sp>
@@ -2070,9 +2317,9 @@
           <a:p>
             <a:fld id="{DA06B892-1E1E-4383-BC49-2ADE51720AB2}" type="datetime1">
               <a:rPr lang="fr-FR" smtClean="0"/>
-              <a:t>11/05/2017</a:t>
+              <a:t>12/05/2017</a:t>
             </a:fld>
-            <a:endParaRPr lang="fr-FR"/>
+            <a:endParaRPr lang="fr-FR" dirty="0"/>
           </a:p>
         </p:txBody>
       </p:sp>
@@ -2091,7 +2338,7 @@
           <a:bodyPr/>
           <a:lstStyle/>
           <a:p>
-            <a:endParaRPr lang="fr-FR"/>
+            <a:endParaRPr lang="fr-FR" dirty="0"/>
           </a:p>
         </p:txBody>
       </p:sp>
@@ -2112,9 +2359,9 @@
           <a:p>
             <a:fld id="{6CDE4B3E-07BE-4C1A-80EE-ED6CBF0AA269}" type="slidenum">
               <a:rPr lang="fr-FR" smtClean="0"/>
-              <a:t>‹#›</a:t>
+              <a:t>‹N°›</a:t>
             </a:fld>
-            <a:endParaRPr lang="fr-FR"/>
+            <a:endParaRPr lang="fr-FR" dirty="0"/>
           </a:p>
         </p:txBody>
       </p:sp>
@@ -2444,9 +2691,9 @@
           <a:p>
             <a:fld id="{62E58AED-4D92-4F44-A6A0-342020D3A9E3}" type="datetime1">
               <a:rPr lang="fr-FR" smtClean="0"/>
-              <a:t>11/05/2017</a:t>
+              <a:t>12/05/2017</a:t>
             </a:fld>
-            <a:endParaRPr lang="fr-FR"/>
+            <a:endParaRPr lang="fr-FR" dirty="0"/>
           </a:p>
         </p:txBody>
       </p:sp>
@@ -2465,7 +2712,7 @@
           <a:bodyPr/>
           <a:lstStyle/>
           <a:p>
-            <a:endParaRPr lang="fr-FR"/>
+            <a:endParaRPr lang="fr-FR" dirty="0"/>
           </a:p>
         </p:txBody>
       </p:sp>
@@ -2486,9 +2733,9 @@
           <a:p>
             <a:fld id="{6CDE4B3E-07BE-4C1A-80EE-ED6CBF0AA269}" type="slidenum">
               <a:rPr lang="fr-FR" smtClean="0"/>
-              <a:t>‹#›</a:t>
+              <a:t>‹N°›</a:t>
             </a:fld>
-            <a:endParaRPr lang="fr-FR"/>
+            <a:endParaRPr lang="fr-FR" dirty="0"/>
           </a:p>
         </p:txBody>
       </p:sp>
@@ -2914,9 +3161,9 @@
           <a:p>
             <a:fld id="{5AC881CF-0792-46E3-8148-AA02AF6BD9B2}" type="datetime1">
               <a:rPr lang="fr-FR" smtClean="0"/>
-              <a:t>11/05/2017</a:t>
+              <a:t>12/05/2017</a:t>
             </a:fld>
-            <a:endParaRPr lang="fr-FR"/>
+            <a:endParaRPr lang="fr-FR" dirty="0"/>
           </a:p>
         </p:txBody>
       </p:sp>
@@ -2935,7 +3182,7 @@
           <a:bodyPr/>
           <a:lstStyle/>
           <a:p>
-            <a:endParaRPr lang="fr-FR"/>
+            <a:endParaRPr lang="fr-FR" dirty="0"/>
           </a:p>
         </p:txBody>
       </p:sp>
@@ -2956,9 +3203,9 @@
           <a:p>
             <a:fld id="{6CDE4B3E-07BE-4C1A-80EE-ED6CBF0AA269}" type="slidenum">
               <a:rPr lang="fr-FR" smtClean="0"/>
-              <a:t>‹#›</a:t>
+              <a:t>‹N°›</a:t>
             </a:fld>
-            <a:endParaRPr lang="fr-FR"/>
+            <a:endParaRPr lang="fr-FR" dirty="0"/>
           </a:p>
         </p:txBody>
       </p:sp>
@@ -3119,9 +3366,9 @@
           <a:p>
             <a:fld id="{ACD2C4C9-D68A-45A9-AEB2-992A119CBFBB}" type="datetime1">
               <a:rPr lang="fr-FR" smtClean="0"/>
-              <a:t>11/05/2017</a:t>
+              <a:t>12/05/2017</a:t>
             </a:fld>
-            <a:endParaRPr lang="fr-FR"/>
+            <a:endParaRPr lang="fr-FR" dirty="0"/>
           </a:p>
         </p:txBody>
       </p:sp>
@@ -3140,7 +3387,7 @@
           <a:bodyPr/>
           <a:lstStyle/>
           <a:p>
-            <a:endParaRPr lang="fr-FR"/>
+            <a:endParaRPr lang="fr-FR" dirty="0"/>
           </a:p>
         </p:txBody>
       </p:sp>
@@ -3161,9 +3408,9 @@
           <a:p>
             <a:fld id="{6CDE4B3E-07BE-4C1A-80EE-ED6CBF0AA269}" type="slidenum">
               <a:rPr lang="fr-FR" smtClean="0"/>
-              <a:t>‹#›</a:t>
+              <a:t>‹N°›</a:t>
             </a:fld>
-            <a:endParaRPr lang="fr-FR"/>
+            <a:endParaRPr lang="fr-FR" dirty="0"/>
           </a:p>
         </p:txBody>
       </p:sp>
@@ -3330,9 +3577,9 @@
           <a:p>
             <a:fld id="{9AFDBF0A-A9CE-4E25-95E4-A849173CFAE2}" type="datetime1">
               <a:rPr lang="fr-FR" smtClean="0"/>
-              <a:t>11/05/2017</a:t>
+              <a:t>12/05/2017</a:t>
             </a:fld>
-            <a:endParaRPr lang="fr-FR"/>
+            <a:endParaRPr lang="fr-FR" dirty="0"/>
           </a:p>
         </p:txBody>
       </p:sp>
@@ -3351,7 +3598,7 @@
           <a:bodyPr/>
           <a:lstStyle/>
           <a:p>
-            <a:endParaRPr lang="fr-FR"/>
+            <a:endParaRPr lang="fr-FR" dirty="0"/>
           </a:p>
         </p:txBody>
       </p:sp>
@@ -3372,9 +3619,9 @@
           <a:p>
             <a:fld id="{6CDE4B3E-07BE-4C1A-80EE-ED6CBF0AA269}" type="slidenum">
               <a:rPr lang="fr-FR" smtClean="0"/>
-              <a:t>‹#›</a:t>
+              <a:t>‹N°›</a:t>
             </a:fld>
-            <a:endParaRPr lang="fr-FR"/>
+            <a:endParaRPr lang="fr-FR" dirty="0"/>
           </a:p>
         </p:txBody>
       </p:sp>
@@ -3562,9 +3809,9 @@
           <a:p>
             <a:fld id="{9BAB0563-697F-4918-A4F8-7F9E5F52A792}" type="datetime1">
               <a:rPr lang="fr-FR" smtClean="0"/>
-              <a:t>11/05/2017</a:t>
+              <a:t>12/05/2017</a:t>
             </a:fld>
-            <a:endParaRPr lang="fr-FR"/>
+            <a:endParaRPr lang="fr-FR" dirty="0"/>
           </a:p>
         </p:txBody>
       </p:sp>
@@ -3583,7 +3830,7 @@
           <a:bodyPr/>
           <a:lstStyle/>
           <a:p>
-            <a:endParaRPr lang="fr-FR"/>
+            <a:endParaRPr lang="fr-FR" dirty="0"/>
           </a:p>
         </p:txBody>
       </p:sp>
@@ -3604,9 +3851,9 @@
           <a:p>
             <a:fld id="{6CDE4B3E-07BE-4C1A-80EE-ED6CBF0AA269}" type="slidenum">
               <a:rPr lang="fr-FR" smtClean="0"/>
-              <a:t>‹#›</a:t>
+              <a:t>‹N°›</a:t>
             </a:fld>
-            <a:endParaRPr lang="fr-FR"/>
+            <a:endParaRPr lang="fr-FR" dirty="0"/>
           </a:p>
         </p:txBody>
       </p:sp>
@@ -3810,9 +4057,9 @@
           <a:p>
             <a:fld id="{D9F9E878-4770-4671-A172-1A17567A49CB}" type="datetime1">
               <a:rPr lang="fr-FR" smtClean="0"/>
-              <a:t>11/05/2017</a:t>
+              <a:t>12/05/2017</a:t>
             </a:fld>
-            <a:endParaRPr lang="fr-FR"/>
+            <a:endParaRPr lang="fr-FR" dirty="0"/>
           </a:p>
         </p:txBody>
       </p:sp>
@@ -3831,7 +4078,7 @@
           <a:bodyPr/>
           <a:lstStyle/>
           <a:p>
-            <a:endParaRPr lang="fr-FR"/>
+            <a:endParaRPr lang="fr-FR" dirty="0"/>
           </a:p>
         </p:txBody>
       </p:sp>
@@ -3852,9 +4099,9 @@
           <a:p>
             <a:fld id="{6CDE4B3E-07BE-4C1A-80EE-ED6CBF0AA269}" type="slidenum">
               <a:rPr lang="fr-FR" smtClean="0"/>
-              <a:t>‹#›</a:t>
+              <a:t>‹N°›</a:t>
             </a:fld>
-            <a:endParaRPr lang="fr-FR"/>
+            <a:endParaRPr lang="fr-FR" dirty="0"/>
           </a:p>
         </p:txBody>
       </p:sp>
@@ -4108,9 +4355,9 @@
           <a:p>
             <a:fld id="{9826385B-362C-468C-B387-FA842AAE97E7}" type="datetime1">
               <a:rPr lang="fr-FR" smtClean="0"/>
-              <a:t>11/05/2017</a:t>
+              <a:t>12/05/2017</a:t>
             </a:fld>
-            <a:endParaRPr lang="fr-FR"/>
+            <a:endParaRPr lang="fr-FR" dirty="0"/>
           </a:p>
         </p:txBody>
       </p:sp>
@@ -4129,7 +4376,7 @@
           <a:bodyPr/>
           <a:lstStyle/>
           <a:p>
-            <a:endParaRPr lang="fr-FR"/>
+            <a:endParaRPr lang="fr-FR" dirty="0"/>
           </a:p>
         </p:txBody>
       </p:sp>
@@ -4150,9 +4397,9 @@
           <a:p>
             <a:fld id="{6CDE4B3E-07BE-4C1A-80EE-ED6CBF0AA269}" type="slidenum">
               <a:rPr lang="fr-FR" smtClean="0"/>
-              <a:t>‹#›</a:t>
+              <a:t>‹N°›</a:t>
             </a:fld>
-            <a:endParaRPr lang="fr-FR"/>
+            <a:endParaRPr lang="fr-FR" dirty="0"/>
           </a:p>
         </p:txBody>
       </p:sp>
@@ -4502,9 +4749,9 @@
           <a:p>
             <a:fld id="{19782F9F-CDA6-4EB1-A311-6BABD9335F2B}" type="datetime1">
               <a:rPr lang="fr-FR" smtClean="0"/>
-              <a:t>11/05/2017</a:t>
+              <a:t>12/05/2017</a:t>
             </a:fld>
-            <a:endParaRPr lang="fr-FR"/>
+            <a:endParaRPr lang="fr-FR" dirty="0"/>
           </a:p>
         </p:txBody>
       </p:sp>
@@ -4523,7 +4770,7 @@
           <a:bodyPr/>
           <a:lstStyle/>
           <a:p>
-            <a:endParaRPr lang="fr-FR"/>
+            <a:endParaRPr lang="fr-FR" dirty="0"/>
           </a:p>
         </p:txBody>
       </p:sp>
@@ -4544,9 +4791,9 @@
           <a:p>
             <a:fld id="{6CDE4B3E-07BE-4C1A-80EE-ED6CBF0AA269}" type="slidenum">
               <a:rPr lang="fr-FR" smtClean="0"/>
-              <a:t>‹#›</a:t>
+              <a:t>‹N°›</a:t>
             </a:fld>
-            <a:endParaRPr lang="fr-FR"/>
+            <a:endParaRPr lang="fr-FR" dirty="0"/>
           </a:p>
         </p:txBody>
       </p:sp>
@@ -4651,9 +4898,9 @@
           <a:p>
             <a:fld id="{C79AB4DB-4EBC-42A3-A4A6-DE43965FDA5D}" type="datetime1">
               <a:rPr lang="fr-FR" smtClean="0"/>
-              <a:t>11/05/2017</a:t>
+              <a:t>12/05/2017</a:t>
             </a:fld>
-            <a:endParaRPr lang="fr-FR"/>
+            <a:endParaRPr lang="fr-FR" dirty="0"/>
           </a:p>
         </p:txBody>
       </p:sp>
@@ -4672,7 +4919,7 @@
           <a:bodyPr/>
           <a:lstStyle/>
           <a:p>
-            <a:endParaRPr lang="fr-FR"/>
+            <a:endParaRPr lang="fr-FR" dirty="0"/>
           </a:p>
         </p:txBody>
       </p:sp>
@@ -4693,9 +4940,9 @@
           <a:p>
             <a:fld id="{6CDE4B3E-07BE-4C1A-80EE-ED6CBF0AA269}" type="slidenum">
               <a:rPr lang="fr-FR" smtClean="0"/>
-              <a:t>‹#›</a:t>
+              <a:t>‹N°›</a:t>
             </a:fld>
-            <a:endParaRPr lang="fr-FR"/>
+            <a:endParaRPr lang="fr-FR" dirty="0"/>
           </a:p>
         </p:txBody>
       </p:sp>
@@ -4777,9 +5024,9 @@
           <a:p>
             <a:fld id="{9CC138F3-0828-43D6-8157-3CA7051D9732}" type="datetime1">
               <a:rPr lang="fr-FR" smtClean="0"/>
-              <a:t>11/05/2017</a:t>
+              <a:t>12/05/2017</a:t>
             </a:fld>
-            <a:endParaRPr lang="fr-FR"/>
+            <a:endParaRPr lang="fr-FR" dirty="0"/>
           </a:p>
         </p:txBody>
       </p:sp>
@@ -4798,7 +5045,7 @@
           <a:bodyPr/>
           <a:lstStyle/>
           <a:p>
-            <a:endParaRPr lang="fr-FR"/>
+            <a:endParaRPr lang="fr-FR" dirty="0"/>
           </a:p>
         </p:txBody>
       </p:sp>
@@ -4819,9 +5066,9 @@
           <a:p>
             <a:fld id="{6CDE4B3E-07BE-4C1A-80EE-ED6CBF0AA269}" type="slidenum">
               <a:rPr lang="fr-FR" smtClean="0"/>
-              <a:t>‹#›</a:t>
+              <a:t>‹N°›</a:t>
             </a:fld>
-            <a:endParaRPr lang="fr-FR"/>
+            <a:endParaRPr lang="fr-FR" dirty="0"/>
           </a:p>
         </p:txBody>
       </p:sp>
@@ -5037,9 +5284,9 @@
           <a:p>
             <a:fld id="{46BB880A-933C-4512-A3D5-92B1410580F6}" type="datetime1">
               <a:rPr lang="fr-FR" smtClean="0"/>
-              <a:t>11/05/2017</a:t>
+              <a:t>12/05/2017</a:t>
             </a:fld>
-            <a:endParaRPr lang="fr-FR"/>
+            <a:endParaRPr lang="fr-FR" dirty="0"/>
           </a:p>
         </p:txBody>
       </p:sp>
@@ -5058,7 +5305,7 @@
           <a:bodyPr/>
           <a:lstStyle/>
           <a:p>
-            <a:endParaRPr lang="fr-FR"/>
+            <a:endParaRPr lang="fr-FR" dirty="0"/>
           </a:p>
         </p:txBody>
       </p:sp>
@@ -5079,9 +5326,9 @@
           <a:p>
             <a:fld id="{6CDE4B3E-07BE-4C1A-80EE-ED6CBF0AA269}" type="slidenum">
               <a:rPr lang="fr-FR" smtClean="0"/>
-              <a:t>‹#›</a:t>
+              <a:t>‹N°›</a:t>
             </a:fld>
-            <a:endParaRPr lang="fr-FR"/>
+            <a:endParaRPr lang="fr-FR" dirty="0"/>
           </a:p>
         </p:txBody>
       </p:sp>
@@ -5266,10 +5513,9 @@
           </a:lstStyle>
           <a:p>
             <a:r>
-              <a:rPr lang="en-US"/>
+              <a:rPr lang="en-US" dirty="0"/>
               <a:t>Click icon to add picture</a:t>
             </a:r>
-            <a:endParaRPr lang="en-US" dirty="0"/>
           </a:p>
         </p:txBody>
       </p:sp>
@@ -5357,9 +5603,9 @@
           <a:p>
             <a:fld id="{AA9B91AA-0CBD-4FD5-B6E0-BAC04C3CB961}" type="datetime1">
               <a:rPr lang="fr-FR" smtClean="0"/>
-              <a:t>11/05/2017</a:t>
+              <a:t>12/05/2017</a:t>
             </a:fld>
-            <a:endParaRPr lang="fr-FR"/>
+            <a:endParaRPr lang="fr-FR" dirty="0"/>
           </a:p>
         </p:txBody>
       </p:sp>
@@ -5378,7 +5624,7 @@
           <a:bodyPr/>
           <a:lstStyle/>
           <a:p>
-            <a:endParaRPr lang="fr-FR"/>
+            <a:endParaRPr lang="fr-FR" dirty="0"/>
           </a:p>
         </p:txBody>
       </p:sp>
@@ -5399,9 +5645,9 @@
           <a:p>
             <a:fld id="{6CDE4B3E-07BE-4C1A-80EE-ED6CBF0AA269}" type="slidenum">
               <a:rPr lang="fr-FR" smtClean="0"/>
-              <a:t>‹#›</a:t>
+              <a:t>‹N°›</a:t>
             </a:fld>
-            <a:endParaRPr lang="fr-FR"/>
+            <a:endParaRPr lang="fr-FR" dirty="0"/>
           </a:p>
         </p:txBody>
       </p:sp>
@@ -5708,9 +5954,9 @@
           <a:p>
             <a:fld id="{2E942461-8A2F-4F2D-94A8-A0BB0E9B0E6B}" type="datetime1">
               <a:rPr lang="fr-FR" smtClean="0"/>
-              <a:t>11/05/2017</a:t>
+              <a:t>12/05/2017</a:t>
             </a:fld>
-            <a:endParaRPr lang="fr-FR"/>
+            <a:endParaRPr lang="fr-FR" dirty="0"/>
           </a:p>
         </p:txBody>
       </p:sp>
@@ -5747,7 +5993,7 @@
             </a:lvl1pPr>
           </a:lstStyle>
           <a:p>
-            <a:endParaRPr lang="fr-FR"/>
+            <a:endParaRPr lang="fr-FR" dirty="0"/>
           </a:p>
         </p:txBody>
       </p:sp>
@@ -5786,9 +6032,9 @@
           <a:p>
             <a:fld id="{6CDE4B3E-07BE-4C1A-80EE-ED6CBF0AA269}" type="slidenum">
               <a:rPr lang="fr-FR" smtClean="0"/>
-              <a:t>‹#›</a:t>
+              <a:t>‹N°›</a:t>
             </a:fld>
-            <a:endParaRPr lang="fr-FR"/>
+            <a:endParaRPr lang="fr-FR" dirty="0"/>
           </a:p>
         </p:txBody>
       </p:sp>
@@ -6289,29 +6535,8 @@
                   </a:outerShdw>
                 </a:effectLst>
               </a:rPr>
-              <a:t>Banque </a:t>
-            </a:r>
-            <a:r>
-              <a:rPr lang="fr-FR" b="1">
-                <a:effectLst>
-                  <a:outerShdw blurRad="38100" dist="38100" dir="2700000" algn="tl">
-                    <a:srgbClr val="000000">
-                      <a:alpha val="43137"/>
-                    </a:srgbClr>
-                  </a:outerShdw>
-                </a:effectLst>
-              </a:rPr>
-              <a:t>en ligne</a:t>
-            </a:r>
-            <a:endParaRPr lang="fr-FR" b="1" dirty="0">
-              <a:effectLst>
-                <a:outerShdw blurRad="38100" dist="38100" dir="2700000" algn="tl">
-                  <a:srgbClr val="000000">
-                    <a:alpha val="43137"/>
-                  </a:srgbClr>
-                </a:outerShdw>
-              </a:effectLst>
-            </a:endParaRPr>
+              <a:t>Banque en ligne</a:t>
+            </a:r>
           </a:p>
         </p:txBody>
       </p:sp>
@@ -6339,7 +6564,7 @@
           <a:p>
             <a:pPr algn="l"/>
             <a:r>
-              <a:rPr lang="fr-FR" sz="3500" b="1" u="sng" dirty="0" err="1">
+              <a:rPr lang="en-GB" sz="3500" b="1" u="sng" dirty="0" smtClean="0">
                 <a:effectLst>
                   <a:outerShdw blurRad="38100" dist="38100" dir="2700000" algn="tl">
                     <a:srgbClr val="000000">
@@ -6351,7 +6576,7 @@
               <a:t>Members</a:t>
             </a:r>
             <a:r>
-              <a:rPr lang="fr-FR" sz="3500" b="1" u="sng" dirty="0">
+              <a:rPr lang="fr-FR" sz="3500" b="1" u="sng" dirty="0" smtClean="0">
                 <a:effectLst>
                   <a:outerShdw blurRad="38100" dist="38100" dir="2700000" algn="tl">
                     <a:srgbClr val="000000">
@@ -6362,6 +6587,15 @@
               </a:rPr>
               <a:t>:</a:t>
             </a:r>
+            <a:endParaRPr lang="fr-FR" sz="3500" b="1" u="sng" dirty="0">
+              <a:effectLst>
+                <a:outerShdw blurRad="38100" dist="38100" dir="2700000" algn="tl">
+                  <a:srgbClr val="000000">
+                    <a:alpha val="43137"/>
+                  </a:srgbClr>
+                </a:outerShdw>
+              </a:effectLst>
+            </a:endParaRPr>
           </a:p>
           <a:p>
             <a:pPr algn="l"/>
@@ -6665,7 +6899,7 @@
           <a:p>
             <a:pPr algn="l"/>
             <a:r>
-              <a:rPr lang="fr-FR" b="1" u="sng" dirty="0" err="1">
+              <a:rPr lang="en-GB" b="1" u="sng" dirty="0" smtClean="0">
                 <a:effectLst>
                   <a:outerShdw blurRad="38100" dist="38100" dir="2700000" algn="tl">
                     <a:srgbClr val="000000">
@@ -6677,7 +6911,7 @@
               <a:t>Supervisors</a:t>
             </a:r>
             <a:r>
-              <a:rPr lang="fr-FR" b="1" u="sng" dirty="0">
+              <a:rPr lang="fr-FR" b="1" u="sng" dirty="0" smtClean="0">
                 <a:effectLst>
                   <a:outerShdw blurRad="38100" dist="38100" dir="2700000" algn="tl">
                     <a:srgbClr val="000000">
@@ -6688,6 +6922,15 @@
               </a:rPr>
               <a:t>:</a:t>
             </a:r>
+            <a:endParaRPr lang="fr-FR" b="1" u="sng" dirty="0">
+              <a:effectLst>
+                <a:outerShdw blurRad="38100" dist="38100" dir="2700000" algn="tl">
+                  <a:srgbClr val="000000">
+                    <a:alpha val="43137"/>
+                  </a:srgbClr>
+                </a:outerShdw>
+              </a:effectLst>
+            </a:endParaRPr>
           </a:p>
           <a:p>
             <a:pPr algn="l"/>
@@ -6715,24 +6958,29 @@
             </a:r>
             <a:r>
               <a:rPr lang="fr-FR" dirty="0"/>
-              <a:t> SERAIS (</a:t>
-            </a:r>
-            <a:r>
-              <a:rPr lang="fr-FR" dirty="0" err="1"/>
+              <a:t> SERAIS </a:t>
+            </a:r>
+            <a:r>
+              <a:rPr lang="fr-FR" dirty="0" smtClean="0"/>
+              <a:t>(</a:t>
+            </a:r>
+            <a:r>
+              <a:rPr lang="en-GB" dirty="0" smtClean="0"/>
               <a:t>Technical</a:t>
             </a:r>
             <a:r>
-              <a:rPr lang="fr-FR" dirty="0"/>
+              <a:rPr lang="fr-FR" dirty="0" smtClean="0"/>
               <a:t> </a:t>
             </a:r>
             <a:r>
-              <a:rPr lang="fr-FR" dirty="0" err="1"/>
+              <a:rPr lang="en-GB" dirty="0" smtClean="0"/>
               <a:t>supervisor</a:t>
             </a:r>
             <a:r>
-              <a:rPr lang="fr-FR" dirty="0"/>
+              <a:rPr lang="fr-FR" dirty="0" smtClean="0"/>
               <a:t>)</a:t>
             </a:r>
+            <a:endParaRPr lang="fr-FR" dirty="0"/>
           </a:p>
           <a:p>
             <a:endParaRPr lang="fr-FR" dirty="0"/>
@@ -6813,6 +7061,13 @@
       </p:transition>
     </mc:Fallback>
   </mc:AlternateContent>
+  <p:timing>
+    <p:tnLst>
+      <p:par>
+        <p:cTn id="1" dur="indefinite" restart="never" nodeType="tmRoot"/>
+      </p:par>
+    </p:tnLst>
+  </p:timing>
 </p:sld>
 </file>
 
@@ -7000,7 +7255,7 @@
               <a:rPr lang="fr-FR" smtClean="0"/>
               <a:t>2</a:t>
             </a:fld>
-            <a:endParaRPr lang="fr-FR"/>
+            <a:endParaRPr lang="fr-FR" dirty="0"/>
           </a:p>
         </p:txBody>
       </p:sp>
@@ -7038,6 +7293,9 @@
                     <p:cTn id="3" fill="hold">
                       <p:stCondLst>
                         <p:cond delay="indefinite"/>
+                        <p:cond evt="onBegin" delay="0">
+                          <p:tn val="2"/>
+                        </p:cond>
                       </p:stCondLst>
                       <p:childTnLst>
                         <p:par>
@@ -7047,10 +7305,13 @@
                             </p:stCondLst>
                             <p:childTnLst>
                               <p:par>
-                                <p:cTn id="5" presetID="42" presetClass="entr" presetSubtype="0" fill="hold" grpId="0" nodeType="clickEffect">
+                                <p:cTn id="5" presetID="42" presetClass="entr" presetSubtype="0" fill="hold" grpId="0" nodeType="afterEffect">
                                   <p:stCondLst>
                                     <p:cond delay="0"/>
                                   </p:stCondLst>
+                                  <p:iterate type="lt">
+                                    <p:tmPct val="10000"/>
+                                  </p:iterate>
                                   <p:childTnLst>
                                     <p:set>
                                       <p:cBhvr>
@@ -7060,11 +7321,7 @@
                                           </p:stCondLst>
                                         </p:cTn>
                                         <p:tgtEl>
-                                          <p:spTgt spid="3">
-                                            <p:txEl>
-                                              <p:pRg st="0" end="0"/>
-                                            </p:txEl>
-                                          </p:spTgt>
+                                          <p:spTgt spid="3"/>
                                         </p:tgtEl>
                                         <p:attrNameLst>
                                           <p:attrName>style.visibility</p:attrName>
@@ -7078,11 +7335,7 @@
                                       <p:cBhvr>
                                         <p:cTn id="7" dur="1000"/>
                                         <p:tgtEl>
-                                          <p:spTgt spid="3">
-                                            <p:txEl>
-                                              <p:pRg st="0" end="0"/>
-                                            </p:txEl>
-                                          </p:spTgt>
+                                          <p:spTgt spid="3"/>
                                         </p:tgtEl>
                                       </p:cBhvr>
                                     </p:animEffect>
@@ -7090,11 +7343,7 @@
                                       <p:cBhvr>
                                         <p:cTn id="8" dur="1000" fill="hold"/>
                                         <p:tgtEl>
-                                          <p:spTgt spid="3">
-                                            <p:txEl>
-                                              <p:pRg st="0" end="0"/>
-                                            </p:txEl>
-                                          </p:spTgt>
+                                          <p:spTgt spid="3"/>
                                         </p:tgtEl>
                                         <p:attrNameLst>
                                           <p:attrName>ppt_x</p:attrName>
@@ -7117,471 +7366,7 @@
                                       <p:cBhvr>
                                         <p:cTn id="9" dur="1000" fill="hold"/>
                                         <p:tgtEl>
-                                          <p:spTgt spid="3">
-                                            <p:txEl>
-                                              <p:pRg st="0" end="0"/>
-                                            </p:txEl>
-                                          </p:spTgt>
-                                        </p:tgtEl>
-                                        <p:attrNameLst>
-                                          <p:attrName>ppt_y</p:attrName>
-                                        </p:attrNameLst>
-                                      </p:cBhvr>
-                                      <p:tavLst>
-                                        <p:tav tm="0">
-                                          <p:val>
-                                            <p:strVal val="#ppt_y+.1"/>
-                                          </p:val>
-                                        </p:tav>
-                                        <p:tav tm="100000">
-                                          <p:val>
-                                            <p:strVal val="#ppt_y"/>
-                                          </p:val>
-                                        </p:tav>
-                                      </p:tavLst>
-                                    </p:anim>
-                                  </p:childTnLst>
-                                </p:cTn>
-                              </p:par>
-                            </p:childTnLst>
-                          </p:cTn>
-                        </p:par>
-                      </p:childTnLst>
-                    </p:cTn>
-                  </p:par>
-                  <p:par>
-                    <p:cTn id="10" fill="hold">
-                      <p:stCondLst>
-                        <p:cond delay="indefinite"/>
-                      </p:stCondLst>
-                      <p:childTnLst>
-                        <p:par>
-                          <p:cTn id="11" fill="hold">
-                            <p:stCondLst>
-                              <p:cond delay="0"/>
-                            </p:stCondLst>
-                            <p:childTnLst>
-                              <p:par>
-                                <p:cTn id="12" presetID="42" presetClass="entr" presetSubtype="0" fill="hold" grpId="0" nodeType="clickEffect">
-                                  <p:stCondLst>
-                                    <p:cond delay="0"/>
-                                  </p:stCondLst>
-                                  <p:childTnLst>
-                                    <p:set>
-                                      <p:cBhvr>
-                                        <p:cTn id="13" dur="1" fill="hold">
-                                          <p:stCondLst>
-                                            <p:cond delay="0"/>
-                                          </p:stCondLst>
-                                        </p:cTn>
-                                        <p:tgtEl>
-                                          <p:spTgt spid="3">
-                                            <p:txEl>
-                                              <p:pRg st="1" end="1"/>
-                                            </p:txEl>
-                                          </p:spTgt>
-                                        </p:tgtEl>
-                                        <p:attrNameLst>
-                                          <p:attrName>style.visibility</p:attrName>
-                                        </p:attrNameLst>
-                                      </p:cBhvr>
-                                      <p:to>
-                                        <p:strVal val="visible"/>
-                                      </p:to>
-                                    </p:set>
-                                    <p:animEffect transition="in" filter="fade">
-                                      <p:cBhvr>
-                                        <p:cTn id="14" dur="1000"/>
-                                        <p:tgtEl>
-                                          <p:spTgt spid="3">
-                                            <p:txEl>
-                                              <p:pRg st="1" end="1"/>
-                                            </p:txEl>
-                                          </p:spTgt>
-                                        </p:tgtEl>
-                                      </p:cBhvr>
-                                    </p:animEffect>
-                                    <p:anim calcmode="lin" valueType="num">
-                                      <p:cBhvr>
-                                        <p:cTn id="15" dur="1000" fill="hold"/>
-                                        <p:tgtEl>
-                                          <p:spTgt spid="3">
-                                            <p:txEl>
-                                              <p:pRg st="1" end="1"/>
-                                            </p:txEl>
-                                          </p:spTgt>
-                                        </p:tgtEl>
-                                        <p:attrNameLst>
-                                          <p:attrName>ppt_x</p:attrName>
-                                        </p:attrNameLst>
-                                      </p:cBhvr>
-                                      <p:tavLst>
-                                        <p:tav tm="0">
-                                          <p:val>
-                                            <p:strVal val="#ppt_x"/>
-                                          </p:val>
-                                        </p:tav>
-                                        <p:tav tm="100000">
-                                          <p:val>
-                                            <p:strVal val="#ppt_x"/>
-                                          </p:val>
-                                        </p:tav>
-                                      </p:tavLst>
-                                    </p:anim>
-                                    <p:anim calcmode="lin" valueType="num">
-                                      <p:cBhvr>
-                                        <p:cTn id="16" dur="1000" fill="hold"/>
-                                        <p:tgtEl>
-                                          <p:spTgt spid="3">
-                                            <p:txEl>
-                                              <p:pRg st="1" end="1"/>
-                                            </p:txEl>
-                                          </p:spTgt>
-                                        </p:tgtEl>
-                                        <p:attrNameLst>
-                                          <p:attrName>ppt_y</p:attrName>
-                                        </p:attrNameLst>
-                                      </p:cBhvr>
-                                      <p:tavLst>
-                                        <p:tav tm="0">
-                                          <p:val>
-                                            <p:strVal val="#ppt_y+.1"/>
-                                          </p:val>
-                                        </p:tav>
-                                        <p:tav tm="100000">
-                                          <p:val>
-                                            <p:strVal val="#ppt_y"/>
-                                          </p:val>
-                                        </p:tav>
-                                      </p:tavLst>
-                                    </p:anim>
-                                  </p:childTnLst>
-                                </p:cTn>
-                              </p:par>
-                            </p:childTnLst>
-                          </p:cTn>
-                        </p:par>
-                      </p:childTnLst>
-                    </p:cTn>
-                  </p:par>
-                  <p:par>
-                    <p:cTn id="17" fill="hold">
-                      <p:stCondLst>
-                        <p:cond delay="indefinite"/>
-                      </p:stCondLst>
-                      <p:childTnLst>
-                        <p:par>
-                          <p:cTn id="18" fill="hold">
-                            <p:stCondLst>
-                              <p:cond delay="0"/>
-                            </p:stCondLst>
-                            <p:childTnLst>
-                              <p:par>
-                                <p:cTn id="19" presetID="42" presetClass="entr" presetSubtype="0" fill="hold" grpId="0" nodeType="clickEffect">
-                                  <p:stCondLst>
-                                    <p:cond delay="0"/>
-                                  </p:stCondLst>
-                                  <p:childTnLst>
-                                    <p:set>
-                                      <p:cBhvr>
-                                        <p:cTn id="20" dur="1" fill="hold">
-                                          <p:stCondLst>
-                                            <p:cond delay="0"/>
-                                          </p:stCondLst>
-                                        </p:cTn>
-                                        <p:tgtEl>
-                                          <p:spTgt spid="3">
-                                            <p:txEl>
-                                              <p:pRg st="2" end="2"/>
-                                            </p:txEl>
-                                          </p:spTgt>
-                                        </p:tgtEl>
-                                        <p:attrNameLst>
-                                          <p:attrName>style.visibility</p:attrName>
-                                        </p:attrNameLst>
-                                      </p:cBhvr>
-                                      <p:to>
-                                        <p:strVal val="visible"/>
-                                      </p:to>
-                                    </p:set>
-                                    <p:animEffect transition="in" filter="fade">
-                                      <p:cBhvr>
-                                        <p:cTn id="21" dur="1000"/>
-                                        <p:tgtEl>
-                                          <p:spTgt spid="3">
-                                            <p:txEl>
-                                              <p:pRg st="2" end="2"/>
-                                            </p:txEl>
-                                          </p:spTgt>
-                                        </p:tgtEl>
-                                      </p:cBhvr>
-                                    </p:animEffect>
-                                    <p:anim calcmode="lin" valueType="num">
-                                      <p:cBhvr>
-                                        <p:cTn id="22" dur="1000" fill="hold"/>
-                                        <p:tgtEl>
-                                          <p:spTgt spid="3">
-                                            <p:txEl>
-                                              <p:pRg st="2" end="2"/>
-                                            </p:txEl>
-                                          </p:spTgt>
-                                        </p:tgtEl>
-                                        <p:attrNameLst>
-                                          <p:attrName>ppt_x</p:attrName>
-                                        </p:attrNameLst>
-                                      </p:cBhvr>
-                                      <p:tavLst>
-                                        <p:tav tm="0">
-                                          <p:val>
-                                            <p:strVal val="#ppt_x"/>
-                                          </p:val>
-                                        </p:tav>
-                                        <p:tav tm="100000">
-                                          <p:val>
-                                            <p:strVal val="#ppt_x"/>
-                                          </p:val>
-                                        </p:tav>
-                                      </p:tavLst>
-                                    </p:anim>
-                                    <p:anim calcmode="lin" valueType="num">
-                                      <p:cBhvr>
-                                        <p:cTn id="23" dur="1000" fill="hold"/>
-                                        <p:tgtEl>
-                                          <p:spTgt spid="3">
-                                            <p:txEl>
-                                              <p:pRg st="2" end="2"/>
-                                            </p:txEl>
-                                          </p:spTgt>
-                                        </p:tgtEl>
-                                        <p:attrNameLst>
-                                          <p:attrName>ppt_y</p:attrName>
-                                        </p:attrNameLst>
-                                      </p:cBhvr>
-                                      <p:tavLst>
-                                        <p:tav tm="0">
-                                          <p:val>
-                                            <p:strVal val="#ppt_y+.1"/>
-                                          </p:val>
-                                        </p:tav>
-                                        <p:tav tm="100000">
-                                          <p:val>
-                                            <p:strVal val="#ppt_y"/>
-                                          </p:val>
-                                        </p:tav>
-                                      </p:tavLst>
-                                    </p:anim>
-                                  </p:childTnLst>
-                                </p:cTn>
-                              </p:par>
-                            </p:childTnLst>
-                          </p:cTn>
-                        </p:par>
-                      </p:childTnLst>
-                    </p:cTn>
-                  </p:par>
-                  <p:par>
-                    <p:cTn id="24" fill="hold">
-                      <p:stCondLst>
-                        <p:cond delay="indefinite"/>
-                      </p:stCondLst>
-                      <p:childTnLst>
-                        <p:par>
-                          <p:cTn id="25" fill="hold">
-                            <p:stCondLst>
-                              <p:cond delay="0"/>
-                            </p:stCondLst>
-                            <p:childTnLst>
-                              <p:par>
-                                <p:cTn id="26" presetID="42" presetClass="entr" presetSubtype="0" fill="hold" grpId="0" nodeType="clickEffect">
-                                  <p:stCondLst>
-                                    <p:cond delay="0"/>
-                                  </p:stCondLst>
-                                  <p:childTnLst>
-                                    <p:set>
-                                      <p:cBhvr>
-                                        <p:cTn id="27" dur="1" fill="hold">
-                                          <p:stCondLst>
-                                            <p:cond delay="0"/>
-                                          </p:stCondLst>
-                                        </p:cTn>
-                                        <p:tgtEl>
-                                          <p:spTgt spid="3">
-                                            <p:txEl>
-                                              <p:pRg st="3" end="3"/>
-                                            </p:txEl>
-                                          </p:spTgt>
-                                        </p:tgtEl>
-                                        <p:attrNameLst>
-                                          <p:attrName>style.visibility</p:attrName>
-                                        </p:attrNameLst>
-                                      </p:cBhvr>
-                                      <p:to>
-                                        <p:strVal val="visible"/>
-                                      </p:to>
-                                    </p:set>
-                                    <p:animEffect transition="in" filter="fade">
-                                      <p:cBhvr>
-                                        <p:cTn id="28" dur="1000"/>
-                                        <p:tgtEl>
-                                          <p:spTgt spid="3">
-                                            <p:txEl>
-                                              <p:pRg st="3" end="3"/>
-                                            </p:txEl>
-                                          </p:spTgt>
-                                        </p:tgtEl>
-                                      </p:cBhvr>
-                                    </p:animEffect>
-                                    <p:anim calcmode="lin" valueType="num">
-                                      <p:cBhvr>
-                                        <p:cTn id="29" dur="1000" fill="hold"/>
-                                        <p:tgtEl>
-                                          <p:spTgt spid="3">
-                                            <p:txEl>
-                                              <p:pRg st="3" end="3"/>
-                                            </p:txEl>
-                                          </p:spTgt>
-                                        </p:tgtEl>
-                                        <p:attrNameLst>
-                                          <p:attrName>ppt_x</p:attrName>
-                                        </p:attrNameLst>
-                                      </p:cBhvr>
-                                      <p:tavLst>
-                                        <p:tav tm="0">
-                                          <p:val>
-                                            <p:strVal val="#ppt_x"/>
-                                          </p:val>
-                                        </p:tav>
-                                        <p:tav tm="100000">
-                                          <p:val>
-                                            <p:strVal val="#ppt_x"/>
-                                          </p:val>
-                                        </p:tav>
-                                      </p:tavLst>
-                                    </p:anim>
-                                    <p:anim calcmode="lin" valueType="num">
-                                      <p:cBhvr>
-                                        <p:cTn id="30" dur="1000" fill="hold"/>
-                                        <p:tgtEl>
-                                          <p:spTgt spid="3">
-                                            <p:txEl>
-                                              <p:pRg st="3" end="3"/>
-                                            </p:txEl>
-                                          </p:spTgt>
-                                        </p:tgtEl>
-                                        <p:attrNameLst>
-                                          <p:attrName>ppt_y</p:attrName>
-                                        </p:attrNameLst>
-                                      </p:cBhvr>
-                                      <p:tavLst>
-                                        <p:tav tm="0">
-                                          <p:val>
-                                            <p:strVal val="#ppt_y+.1"/>
-                                          </p:val>
-                                        </p:tav>
-                                        <p:tav tm="100000">
-                                          <p:val>
-                                            <p:strVal val="#ppt_y"/>
-                                          </p:val>
-                                        </p:tav>
-                                      </p:tavLst>
-                                    </p:anim>
-                                  </p:childTnLst>
-                                </p:cTn>
-                              </p:par>
-                            </p:childTnLst>
-                          </p:cTn>
-                        </p:par>
-                      </p:childTnLst>
-                    </p:cTn>
-                  </p:par>
-                  <p:par>
-                    <p:cTn id="31" fill="hold">
-                      <p:stCondLst>
-                        <p:cond delay="indefinite"/>
-                      </p:stCondLst>
-                      <p:childTnLst>
-                        <p:par>
-                          <p:cTn id="32" fill="hold">
-                            <p:stCondLst>
-                              <p:cond delay="0"/>
-                            </p:stCondLst>
-                            <p:childTnLst>
-                              <p:par>
-                                <p:cTn id="33" presetID="42" presetClass="entr" presetSubtype="0" fill="hold" grpId="0" nodeType="clickEffect">
-                                  <p:stCondLst>
-                                    <p:cond delay="0"/>
-                                  </p:stCondLst>
-                                  <p:childTnLst>
-                                    <p:set>
-                                      <p:cBhvr>
-                                        <p:cTn id="34" dur="1" fill="hold">
-                                          <p:stCondLst>
-                                            <p:cond delay="0"/>
-                                          </p:stCondLst>
-                                        </p:cTn>
-                                        <p:tgtEl>
-                                          <p:spTgt spid="3">
-                                            <p:txEl>
-                                              <p:pRg st="4" end="4"/>
-                                            </p:txEl>
-                                          </p:spTgt>
-                                        </p:tgtEl>
-                                        <p:attrNameLst>
-                                          <p:attrName>style.visibility</p:attrName>
-                                        </p:attrNameLst>
-                                      </p:cBhvr>
-                                      <p:to>
-                                        <p:strVal val="visible"/>
-                                      </p:to>
-                                    </p:set>
-                                    <p:animEffect transition="in" filter="fade">
-                                      <p:cBhvr>
-                                        <p:cTn id="35" dur="1000"/>
-                                        <p:tgtEl>
-                                          <p:spTgt spid="3">
-                                            <p:txEl>
-                                              <p:pRg st="4" end="4"/>
-                                            </p:txEl>
-                                          </p:spTgt>
-                                        </p:tgtEl>
-                                      </p:cBhvr>
-                                    </p:animEffect>
-                                    <p:anim calcmode="lin" valueType="num">
-                                      <p:cBhvr>
-                                        <p:cTn id="36" dur="1000" fill="hold"/>
-                                        <p:tgtEl>
-                                          <p:spTgt spid="3">
-                                            <p:txEl>
-                                              <p:pRg st="4" end="4"/>
-                                            </p:txEl>
-                                          </p:spTgt>
-                                        </p:tgtEl>
-                                        <p:attrNameLst>
-                                          <p:attrName>ppt_x</p:attrName>
-                                        </p:attrNameLst>
-                                      </p:cBhvr>
-                                      <p:tavLst>
-                                        <p:tav tm="0">
-                                          <p:val>
-                                            <p:strVal val="#ppt_x"/>
-                                          </p:val>
-                                        </p:tav>
-                                        <p:tav tm="100000">
-                                          <p:val>
-                                            <p:strVal val="#ppt_x"/>
-                                          </p:val>
-                                        </p:tav>
-                                      </p:tavLst>
-                                    </p:anim>
-                                    <p:anim calcmode="lin" valueType="num">
-                                      <p:cBhvr>
-                                        <p:cTn id="37" dur="1000" fill="hold"/>
-                                        <p:tgtEl>
-                                          <p:spTgt spid="3">
-                                            <p:txEl>
-                                              <p:pRg st="4" end="4"/>
-                                            </p:txEl>
-                                          </p:spTgt>
+                                          <p:spTgt spid="3"/>
                                         </p:tgtEl>
                                         <p:attrNameLst>
                                           <p:attrName>ppt_y</p:attrName>
@@ -7631,7 +7416,7 @@
       </p:par>
     </p:tnLst>
     <p:bldLst>
-      <p:bldP spid="3" grpId="0" build="p"/>
+      <p:bldP spid="3" grpId="0"/>
     </p:bldLst>
   </p:timing>
 </p:sld>
@@ -7780,7 +7565,7 @@
               <a:t>The information system of an online </a:t>
             </a:r>
             <a:r>
-              <a:rPr lang="fr-FR" sz="2000" dirty="0" err="1">
+              <a:rPr lang="en-GB" sz="2000" dirty="0" smtClean="0">
                 <a:effectLst>
                   <a:outerShdw blurRad="38100" dist="38100" dir="2700000" algn="tl">
                     <a:srgbClr val="000000">
@@ -7791,7 +7576,7 @@
               </a:rPr>
               <a:t>bank</a:t>
             </a:r>
-            <a:endParaRPr lang="fr-FR" sz="2000" dirty="0">
+            <a:endParaRPr lang="en-GB" sz="2000" dirty="0">
               <a:effectLst>
                 <a:outerShdw blurRad="38100" dist="38100" dir="2700000" algn="tl">
                   <a:srgbClr val="000000">
@@ -7865,7 +7650,7 @@
           <a:prstGeom prst="straightConnector1">
             <a:avLst/>
           </a:prstGeom>
-          <a:ln w="19050">
+          <a:ln w="28575">
             <a:solidFill>
               <a:schemeClr val="accent1"/>
             </a:solidFill>
@@ -7944,7 +7729,7 @@
               <a:rPr lang="fr-FR" smtClean="0"/>
               <a:t>3</a:t>
             </a:fld>
-            <a:endParaRPr lang="fr-FR"/>
+            <a:endParaRPr lang="fr-FR" dirty="0"/>
           </a:p>
         </p:txBody>
       </p:sp>
@@ -8583,7 +8368,7 @@
         </p:blipFill>
         <p:spPr>
           <a:xfrm>
-            <a:off x="7665512" y="3589866"/>
+            <a:off x="8257694" y="643926"/>
             <a:ext cx="3037657" cy="1822594"/>
           </a:xfrm>
           <a:prstGeom prst="rect">
@@ -8640,7 +8425,7 @@
               <a:rPr lang="fr-FR" smtClean="0"/>
               <a:t>4</a:t>
             </a:fld>
-            <a:endParaRPr lang="fr-FR"/>
+            <a:endParaRPr lang="fr-FR" dirty="0"/>
           </a:p>
         </p:txBody>
       </p:sp>
@@ -9643,12 +9428,16 @@
           <a:lstStyle/>
           <a:p>
             <a:r>
-              <a:rPr lang="fr-FR" dirty="0" err="1"/>
+              <a:rPr lang="en-GB" dirty="0" smtClean="0"/>
               <a:t>Thin</a:t>
             </a:r>
             <a:r>
+              <a:rPr lang="fr-FR" dirty="0" smtClean="0"/>
+              <a:t> </a:t>
+            </a:r>
+            <a:r>
               <a:rPr lang="fr-FR" dirty="0"/>
-              <a:t> client</a:t>
+              <a:t>client</a:t>
             </a:r>
           </a:p>
         </p:txBody>
@@ -9960,7 +9749,7 @@
               <a:rPr lang="fr-FR" smtClean="0"/>
               <a:t>5</a:t>
             </a:fld>
-            <a:endParaRPr lang="fr-FR"/>
+            <a:endParaRPr lang="fr-FR" dirty="0"/>
           </a:p>
         </p:txBody>
       </p:sp>
@@ -9987,12 +9776,16 @@
           <a:lstStyle/>
           <a:p>
             <a:r>
-              <a:rPr lang="fr-FR" altLang="zh-CN" dirty="0" err="1"/>
+              <a:rPr lang="en-GB" altLang="zh-CN" dirty="0" smtClean="0"/>
               <a:t>Thin</a:t>
             </a:r>
             <a:r>
+              <a:rPr lang="fr-FR" altLang="zh-CN" dirty="0" smtClean="0"/>
+              <a:t> </a:t>
+            </a:r>
+            <a:r>
               <a:rPr lang="fr-FR" altLang="zh-CN" dirty="0"/>
-              <a:t> client</a:t>
+              <a:t>client</a:t>
             </a:r>
           </a:p>
         </p:txBody>
@@ -10787,7 +10580,7 @@
           <p:nvPr/>
         </p:nvPicPr>
         <p:blipFill>
-          <a:blip r:embed="rId2"/>
+          <a:blip r:embed="rId3"/>
           <a:stretch>
             <a:fillRect/>
           </a:stretch>
@@ -10811,7 +10604,7 @@
           <p:nvPr/>
         </p:nvPicPr>
         <p:blipFill>
-          <a:blip r:embed="rId3"/>
+          <a:blip r:embed="rId4"/>
           <a:stretch>
             <a:fillRect/>
           </a:stretch>
@@ -10835,14 +10628,14 @@
           <p:nvPr/>
         </p:nvPicPr>
         <p:blipFill>
-          <a:blip r:embed="rId4"/>
+          <a:blip r:embed="rId5"/>
           <a:stretch>
             <a:fillRect/>
           </a:stretch>
         </p:blipFill>
         <p:spPr>
           <a:xfrm>
-            <a:off x="6956006" y="4265547"/>
+            <a:off x="6353678" y="4412846"/>
             <a:ext cx="1695854" cy="1695854"/>
           </a:xfrm>
           <a:prstGeom prst="rect">
@@ -10859,7 +10652,7 @@
           <p:nvPr/>
         </p:nvPicPr>
         <p:blipFill>
-          <a:blip r:embed="rId5"/>
+          <a:blip r:embed="rId6"/>
           <a:stretch>
             <a:fillRect/>
           </a:stretch>
@@ -10883,14 +10676,14 @@
           <p:nvPr/>
         </p:nvPicPr>
         <p:blipFill>
-          <a:blip r:embed="rId6"/>
+          <a:blip r:embed="rId7"/>
           <a:stretch>
             <a:fillRect/>
           </a:stretch>
         </p:blipFill>
         <p:spPr>
           <a:xfrm>
-            <a:off x="3917707" y="3105709"/>
+            <a:off x="3327975" y="3373787"/>
             <a:ext cx="2828925" cy="1619250"/>
           </a:xfrm>
           <a:prstGeom prst="rect">
@@ -10907,14 +10700,14 @@
           <p:nvPr/>
         </p:nvPicPr>
         <p:blipFill>
-          <a:blip r:embed="rId7"/>
+          <a:blip r:embed="rId8"/>
           <a:stretch>
             <a:fillRect/>
           </a:stretch>
         </p:blipFill>
         <p:spPr>
           <a:xfrm>
-            <a:off x="7856561" y="2927786"/>
+            <a:off x="8073622" y="3725776"/>
             <a:ext cx="1262598" cy="1175794"/>
           </a:xfrm>
           <a:prstGeom prst="rect">
@@ -10931,14 +10724,14 @@
           <p:nvPr/>
         </p:nvPicPr>
         <p:blipFill>
-          <a:blip r:embed="rId8"/>
+          <a:blip r:embed="rId9"/>
           <a:stretch>
             <a:fillRect/>
           </a:stretch>
         </p:blipFill>
         <p:spPr>
           <a:xfrm>
-            <a:off x="1490895" y="2657784"/>
+            <a:off x="976046" y="2986088"/>
             <a:ext cx="2038350" cy="981075"/>
           </a:xfrm>
           <a:prstGeom prst="rect">
@@ -10978,7 +10771,7 @@
           <p:nvPr/>
         </p:nvPicPr>
         <p:blipFill>
-          <a:blip r:embed="rId9">
+          <a:blip r:embed="rId10">
             <a:extLst>
               <a:ext uri="{28A0092B-C50C-407E-A947-70E740481C1C}">
                 <a14:useLocalDpi xmlns:a14="http://schemas.microsoft.com/office/drawing/2010/main" val="0"/>
@@ -10997,6 +10790,47 @@
           <a:prstGeom prst="rect">
             <a:avLst/>
           </a:prstGeom>
+        </p:spPr>
+      </p:pic>
+      <p:pic>
+        <p:nvPicPr>
+          <p:cNvPr id="1026" name="Picture 2" descr="MySQL.svg"/>
+          <p:cNvPicPr>
+            <a:picLocks noChangeAspect="1" noChangeArrowheads="1"/>
+          </p:cNvPicPr>
+          <p:nvPr/>
+        </p:nvPicPr>
+        <p:blipFill>
+          <a:blip r:embed="rId11">
+            <a:extLst>
+              <a:ext uri="{28A0092B-C50C-407E-A947-70E740481C1C}">
+                <a14:useLocalDpi xmlns:a14="http://schemas.microsoft.com/office/drawing/2010/main" val="0"/>
+              </a:ext>
+            </a:extLst>
+          </a:blip>
+          <a:srcRect/>
+          <a:stretch>
+            <a:fillRect/>
+          </a:stretch>
+        </p:blipFill>
+        <p:spPr bwMode="auto">
+          <a:xfrm>
+            <a:off x="6402520" y="3053361"/>
+            <a:ext cx="1714500" cy="885825"/>
+          </a:xfrm>
+          <a:prstGeom prst="rect">
+            <a:avLst/>
+          </a:prstGeom>
+          <a:noFill/>
+          <a:extLst>
+            <a:ext uri="{909E8E84-426E-40DD-AFC4-6F175D3DCCD1}">
+              <a14:hiddenFill xmlns:a14="http://schemas.microsoft.com/office/drawing/2010/main">
+                <a:solidFill>
+                  <a:srgbClr val="FFFFFF"/>
+                </a:solidFill>
+              </a14:hiddenFill>
+            </a:ext>
+          </a:extLst>
         </p:spPr>
       </p:pic>
     </p:spTree>
@@ -11917,7 +11751,7 @@
             <p:nvPr/>
           </p:nvPicPr>
           <p:blipFill rotWithShape="1">
-            <a:blip r:embed="rId2" cstate="print">
+            <a:blip r:embed="rId3" cstate="print">
               <a:extLst>
                 <a:ext uri="{28A0092B-C50C-407E-A947-70E740481C1C}">
                   <a14:useLocalDpi xmlns:a14="http://schemas.microsoft.com/office/drawing/2010/main" val="0"/>
@@ -12200,7 +12034,7 @@
           <a:p>
             <a:pPr algn="ctr"/>
             <a:r>
-              <a:rPr lang="fr-FR" sz="3200" dirty="0">
+              <a:rPr lang="fr-FR" sz="3200" dirty="0" err="1" smtClean="0">
                 <a:effectLst>
                   <a:outerShdw blurRad="38100" dist="38100" dir="2700000" algn="tl">
                     <a:srgbClr val="000000">
@@ -12209,7 +12043,7 @@
                   </a:outerShdw>
                 </a:effectLst>
               </a:rPr>
-              <a:t>Bilan</a:t>
+              <a:t>Summary</a:t>
             </a:r>
             <a:endParaRPr lang="fr-FR" dirty="0">
               <a:effectLst>
@@ -12231,7 +12065,7 @@
         </p:nvSpPr>
         <p:spPr>
           <a:xfrm>
-            <a:off x="6250823" y="2971456"/>
+            <a:off x="6428387" y="2904000"/>
             <a:ext cx="4103078" cy="584775"/>
           </a:xfrm>
           <a:prstGeom prst="rect">
@@ -12247,7 +12081,7 @@
           <a:p>
             <a:pPr algn="ctr"/>
             <a:r>
-              <a:rPr lang="fr-FR" sz="3200" dirty="0">
+              <a:rPr lang="en-GB" sz="3200" dirty="0" smtClean="0">
                 <a:effectLst>
                   <a:outerShdw blurRad="38100" dist="38100" dir="2700000" algn="tl">
                     <a:srgbClr val="000000">
@@ -12256,10 +12090,10 @@
                   </a:outerShdw>
                 </a:effectLst>
               </a:rPr>
-              <a:t>Difficultés</a:t>
-            </a:r>
-            <a:r>
-              <a:rPr lang="fr-FR" sz="2000" dirty="0">
+              <a:t>Difficulties</a:t>
+            </a:r>
+            <a:r>
+              <a:rPr lang="fr-FR" sz="3200" dirty="0" smtClean="0">
                 <a:effectLst>
                   <a:outerShdw blurRad="38100" dist="38100" dir="2700000" algn="tl">
                     <a:srgbClr val="000000">
@@ -12271,7 +12105,7 @@
               <a:t> </a:t>
             </a:r>
             <a:r>
-              <a:rPr lang="fr-FR" sz="3200" dirty="0">
+              <a:rPr lang="en-GB" sz="3200" dirty="0" smtClean="0">
                 <a:effectLst>
                   <a:outerShdw blurRad="38100" dist="38100" dir="2700000" algn="tl">
                     <a:srgbClr val="000000">
@@ -12280,8 +12114,17 @@
                   </a:outerShdw>
                 </a:effectLst>
               </a:rPr>
-              <a:t>rencontrées</a:t>
-            </a:r>
+              <a:t>encountered</a:t>
+            </a:r>
+            <a:endParaRPr lang="en-GB" sz="3200" dirty="0">
+              <a:effectLst>
+                <a:outerShdw blurRad="38100" dist="38100" dir="2700000" algn="tl">
+                  <a:srgbClr val="000000">
+                    <a:alpha val="43137"/>
+                  </a:srgbClr>
+                </a:outerShdw>
+              </a:effectLst>
+            </a:endParaRPr>
           </a:p>
         </p:txBody>
       </p:sp>
@@ -12293,8 +12136,8 @@
         </p:nvSpPr>
         <p:spPr>
           <a:xfrm>
-            <a:off x="3427281" y="3945855"/>
-            <a:ext cx="3272456" cy="591666"/>
+            <a:off x="3390902" y="3915572"/>
+            <a:ext cx="4788032" cy="584775"/>
           </a:xfrm>
           <a:prstGeom prst="rect">
             <a:avLst/>
@@ -12308,7 +12151,7 @@
           <a:lstStyle/>
           <a:p>
             <a:r>
-              <a:rPr lang="fr-FR" sz="3200" dirty="0">
+              <a:rPr lang="fr-FR" sz="3200" dirty="0" smtClean="0">
                 <a:effectLst>
                   <a:outerShdw blurRad="38100" dist="38100" dir="2700000" algn="tl">
                     <a:srgbClr val="000000">
@@ -12317,14 +12160,10 @@
                   </a:outerShdw>
                 </a:effectLst>
               </a:rPr>
-              <a:t>Apports</a:t>
-            </a:r>
-            <a:r>
-              <a:rPr lang="fr-FR" dirty="0"/>
-              <a:t> </a:t>
-            </a:r>
-            <a:r>
-              <a:rPr lang="fr-FR" sz="3200" dirty="0">
+              <a:t>Contributions of the </a:t>
+            </a:r>
+            <a:r>
+              <a:rPr lang="en-GB" sz="3200" dirty="0" smtClean="0">
                 <a:effectLst>
                   <a:outerShdw blurRad="38100" dist="38100" dir="2700000" algn="tl">
                     <a:srgbClr val="000000">
@@ -12333,24 +12172,17 @@
                   </a:outerShdw>
                 </a:effectLst>
               </a:rPr>
-              <a:t>du</a:t>
-            </a:r>
-            <a:r>
-              <a:rPr lang="fr-FR" dirty="0"/>
-              <a:t> </a:t>
-            </a:r>
-            <a:r>
-              <a:rPr lang="fr-FR" sz="3200" dirty="0">
-                <a:effectLst>
-                  <a:outerShdw blurRad="38100" dist="38100" dir="2700000" algn="tl">
-                    <a:srgbClr val="000000">
-                      <a:alpha val="43137"/>
-                    </a:srgbClr>
-                  </a:outerShdw>
-                </a:effectLst>
-              </a:rPr>
-              <a:t>projet</a:t>
-            </a:r>
+              <a:t>project</a:t>
+            </a:r>
+            <a:endParaRPr lang="en-GB" sz="3200" dirty="0">
+              <a:effectLst>
+                <a:outerShdw blurRad="38100" dist="38100" dir="2700000" algn="tl">
+                  <a:srgbClr val="000000">
+                    <a:alpha val="43137"/>
+                  </a:srgbClr>
+                </a:outerShdw>
+              </a:effectLst>
+            </a:endParaRPr>
           </a:p>
         </p:txBody>
       </p:sp>
@@ -12377,7 +12209,7 @@
           <a:lstStyle/>
           <a:p>
             <a:r>
-              <a:rPr lang="fr-FR" sz="3200" dirty="0">
+              <a:rPr lang="en-GB" sz="3200" dirty="0" smtClean="0">
                 <a:effectLst>
                   <a:outerShdw blurRad="38100" dist="38100" dir="2700000" algn="tl">
                     <a:srgbClr val="000000">
@@ -12386,8 +12218,29 @@
                   </a:outerShdw>
                 </a:effectLst>
               </a:rPr>
-              <a:t>Points d’amélioration </a:t>
-            </a:r>
+              <a:t>Improvement</a:t>
+            </a:r>
+            <a:r>
+              <a:rPr lang="fr-FR" sz="3200" dirty="0" smtClean="0">
+                <a:effectLst>
+                  <a:outerShdw blurRad="38100" dist="38100" dir="2700000" algn="tl">
+                    <a:srgbClr val="000000">
+                      <a:alpha val="43137"/>
+                    </a:srgbClr>
+                  </a:outerShdw>
+                </a:effectLst>
+              </a:rPr>
+              <a:t> points</a:t>
+            </a:r>
+            <a:endParaRPr lang="fr-FR" sz="3200" dirty="0">
+              <a:effectLst>
+                <a:outerShdw blurRad="38100" dist="38100" dir="2700000" algn="tl">
+                  <a:srgbClr val="000000">
+                    <a:alpha val="43137"/>
+                  </a:srgbClr>
+                </a:outerShdw>
+              </a:effectLst>
+            </a:endParaRPr>
           </a:p>
         </p:txBody>
       </p:sp>
@@ -13942,7 +13795,7 @@
           <a:lstStyle/>
           <a:p>
             <a:r>
-              <a:rPr lang="fr-FR" dirty="0" err="1">
+              <a:rPr lang="en-GB" dirty="0" smtClean="0">
                 <a:effectLst>
                   <a:outerShdw blurRad="38100" dist="38100" dir="2700000" algn="tl">
                     <a:srgbClr val="000000">
@@ -13954,7 +13807,7 @@
               <a:t>Thank</a:t>
             </a:r>
             <a:r>
-              <a:rPr lang="fr-FR" dirty="0">
+              <a:rPr lang="fr-FR" dirty="0" smtClean="0">
                 <a:effectLst>
                   <a:outerShdw blurRad="38100" dist="38100" dir="2700000" algn="tl">
                     <a:srgbClr val="000000">
@@ -13990,7 +13843,7 @@
               <a:t> for </a:t>
             </a:r>
             <a:r>
-              <a:rPr lang="fr-FR" dirty="0" err="1">
+              <a:rPr lang="en-GB" dirty="0" smtClean="0">
                 <a:effectLst>
                   <a:outerShdw blurRad="38100" dist="38100" dir="2700000" algn="tl">
                     <a:srgbClr val="000000">
@@ -14002,6 +13855,18 @@
               <a:t>your</a:t>
             </a:r>
             <a:r>
+              <a:rPr lang="fr-FR" dirty="0" smtClean="0">
+                <a:effectLst>
+                  <a:outerShdw blurRad="38100" dist="38100" dir="2700000" algn="tl">
+                    <a:srgbClr val="000000">
+                      <a:alpha val="43137"/>
+                    </a:srgbClr>
+                  </a:outerShdw>
+                </a:effectLst>
+              </a:rPr>
+              <a:t> </a:t>
+            </a:r>
+            <a:r>
               <a:rPr lang="fr-FR" dirty="0">
                 <a:effectLst>
                   <a:outerShdw blurRad="38100" dist="38100" dir="2700000" algn="tl">
@@ -14011,7 +13876,7 @@
                   </a:outerShdw>
                 </a:effectLst>
               </a:rPr>
-              <a:t> attention</a:t>
+              <a:t>attention</a:t>
             </a:r>
             <a:r>
               <a:rPr lang="fr-FR" dirty="0"/>
@@ -14069,7 +13934,7 @@
               <a:rPr lang="fr-FR" smtClean="0"/>
               <a:t>9</a:t>
             </a:fld>
-            <a:endParaRPr lang="fr-FR"/>
+            <a:endParaRPr lang="fr-FR" dirty="0"/>
           </a:p>
         </p:txBody>
       </p:sp>
@@ -14095,6 +13960,13 @@
       </p:transition>
     </mc:Fallback>
   </mc:AlternateContent>
+  <p:timing>
+    <p:tnLst>
+      <p:par>
+        <p:cTn id="1" dur="indefinite" restart="never" nodeType="tmRoot"/>
+      </p:par>
+    </p:tnLst>
+  </p:timing>
 </p:sld>
 </file>
 

</xml_diff>